<commit_message>
User Interface overhaul + Analytics
Overhauled the design of the user interface. Implemented analytics tools and utilities. Fixed issue with pong game, ball getting stuck
</commit_message>
<xml_diff>
--- a/MobileGameDev-Re/DraftPresentation.pptx
+++ b/MobileGameDev-Re/DraftPresentation.pptx
@@ -111,6 +111,11 @@
       </a:defRPr>
     </a:lvl9pPr>
   </p:defaultTextStyle>
+  <p:extLst>
+    <p:ext uri="{EFAFB233-063F-42B5-8137-9DF3F51BA10A}">
+      <p15:sldGuideLst xmlns:p15="http://schemas.microsoft.com/office/powerpoint/2012/main"/>
+    </p:ext>
+  </p:extLst>
 </p:presentation>
 </file>
 
@@ -3535,7 +3540,7 @@
           <a:p>
             <a:r>
               <a:rPr lang="en-GB" dirty="0"/>
-              <a:t>Analytics</a:t>
+              <a:t>Unity Gaming Services | Analytics</a:t>
             </a:r>
           </a:p>
         </p:txBody>
@@ -3618,7 +3623,7 @@
           <a:p>
             <a:r>
               <a:rPr lang="en-GB" dirty="0"/>
-              <a:t>Monetization</a:t>
+              <a:t>Unity Gaming Services | Monetization</a:t>
             </a:r>
           </a:p>
         </p:txBody>

</xml_diff>

<commit_message>
Further UI improvements / Audio implementation
Made improvements to options menu interface, added FMOD and audio sounds for button presses.
</commit_message>
<xml_diff>
--- a/MobileGameDev-Re/DraftPresentation.pptx
+++ b/MobileGameDev-Re/DraftPresentation.pptx
@@ -5,14 +5,20 @@
     <p:sldMasterId id="2147483648" r:id="rId1"/>
   </p:sldMasterIdLst>
   <p:sldIdLst>
-    <p:sldId id="256" r:id="rId2"/>
-    <p:sldId id="257" r:id="rId3"/>
-    <p:sldId id="258" r:id="rId4"/>
-    <p:sldId id="259" r:id="rId5"/>
-    <p:sldId id="260" r:id="rId6"/>
-    <p:sldId id="261" r:id="rId7"/>
-    <p:sldId id="262" r:id="rId8"/>
-    <p:sldId id="263" r:id="rId9"/>
+    <p:sldId id="268" r:id="rId2"/>
+    <p:sldId id="269" r:id="rId3"/>
+    <p:sldId id="256" r:id="rId4"/>
+    <p:sldId id="257" r:id="rId5"/>
+    <p:sldId id="258" r:id="rId6"/>
+    <p:sldId id="259" r:id="rId7"/>
+    <p:sldId id="260" r:id="rId8"/>
+    <p:sldId id="261" r:id="rId9"/>
+    <p:sldId id="262" r:id="rId10"/>
+    <p:sldId id="263" r:id="rId11"/>
+    <p:sldId id="267" r:id="rId12"/>
+    <p:sldId id="264" r:id="rId13"/>
+    <p:sldId id="265" r:id="rId14"/>
+    <p:sldId id="266" r:id="rId15"/>
   </p:sldIdLst>
   <p:sldSz cx="12192000" cy="6858000"/>
   <p:notesSz cx="6858000" cy="9144000"/>
@@ -268,7 +274,7 @@
           <a:p>
             <a:fld id="{67F33658-59C4-4468-8AD9-203567349AEB}" type="datetimeFigureOut">
               <a:rPr lang="en-GB" smtClean="0"/>
-              <a:t>11/07/2022</a:t>
+              <a:t>12/07/2022</a:t>
             </a:fld>
             <a:endParaRPr lang="en-GB"/>
           </a:p>
@@ -468,7 +474,7 @@
           <a:p>
             <a:fld id="{67F33658-59C4-4468-8AD9-203567349AEB}" type="datetimeFigureOut">
               <a:rPr lang="en-GB" smtClean="0"/>
-              <a:t>11/07/2022</a:t>
+              <a:t>12/07/2022</a:t>
             </a:fld>
             <a:endParaRPr lang="en-GB"/>
           </a:p>
@@ -678,7 +684,7 @@
           <a:p>
             <a:fld id="{67F33658-59C4-4468-8AD9-203567349AEB}" type="datetimeFigureOut">
               <a:rPr lang="en-GB" smtClean="0"/>
-              <a:t>11/07/2022</a:t>
+              <a:t>12/07/2022</a:t>
             </a:fld>
             <a:endParaRPr lang="en-GB"/>
           </a:p>
@@ -878,7 +884,7 @@
           <a:p>
             <a:fld id="{67F33658-59C4-4468-8AD9-203567349AEB}" type="datetimeFigureOut">
               <a:rPr lang="en-GB" smtClean="0"/>
-              <a:t>11/07/2022</a:t>
+              <a:t>12/07/2022</a:t>
             </a:fld>
             <a:endParaRPr lang="en-GB"/>
           </a:p>
@@ -1154,7 +1160,7 @@
           <a:p>
             <a:fld id="{67F33658-59C4-4468-8AD9-203567349AEB}" type="datetimeFigureOut">
               <a:rPr lang="en-GB" smtClean="0"/>
-              <a:t>11/07/2022</a:t>
+              <a:t>12/07/2022</a:t>
             </a:fld>
             <a:endParaRPr lang="en-GB"/>
           </a:p>
@@ -1422,7 +1428,7 @@
           <a:p>
             <a:fld id="{67F33658-59C4-4468-8AD9-203567349AEB}" type="datetimeFigureOut">
               <a:rPr lang="en-GB" smtClean="0"/>
-              <a:t>11/07/2022</a:t>
+              <a:t>12/07/2022</a:t>
             </a:fld>
             <a:endParaRPr lang="en-GB"/>
           </a:p>
@@ -1837,7 +1843,7 @@
           <a:p>
             <a:fld id="{67F33658-59C4-4468-8AD9-203567349AEB}" type="datetimeFigureOut">
               <a:rPr lang="en-GB" smtClean="0"/>
-              <a:t>11/07/2022</a:t>
+              <a:t>12/07/2022</a:t>
             </a:fld>
             <a:endParaRPr lang="en-GB"/>
           </a:p>
@@ -1979,7 +1985,7 @@
           <a:p>
             <a:fld id="{67F33658-59C4-4468-8AD9-203567349AEB}" type="datetimeFigureOut">
               <a:rPr lang="en-GB" smtClean="0"/>
-              <a:t>11/07/2022</a:t>
+              <a:t>12/07/2022</a:t>
             </a:fld>
             <a:endParaRPr lang="en-GB"/>
           </a:p>
@@ -2092,7 +2098,7 @@
           <a:p>
             <a:fld id="{67F33658-59C4-4468-8AD9-203567349AEB}" type="datetimeFigureOut">
               <a:rPr lang="en-GB" smtClean="0"/>
-              <a:t>11/07/2022</a:t>
+              <a:t>12/07/2022</a:t>
             </a:fld>
             <a:endParaRPr lang="en-GB"/>
           </a:p>
@@ -2405,7 +2411,7 @@
           <a:p>
             <a:fld id="{67F33658-59C4-4468-8AD9-203567349AEB}" type="datetimeFigureOut">
               <a:rPr lang="en-GB" smtClean="0"/>
-              <a:t>11/07/2022</a:t>
+              <a:t>12/07/2022</a:t>
             </a:fld>
             <a:endParaRPr lang="en-GB"/>
           </a:p>
@@ -2694,7 +2700,7 @@
           <a:p>
             <a:fld id="{67F33658-59C4-4468-8AD9-203567349AEB}" type="datetimeFigureOut">
               <a:rPr lang="en-GB" smtClean="0"/>
-              <a:t>11/07/2022</a:t>
+              <a:t>12/07/2022</a:t>
             </a:fld>
             <a:endParaRPr lang="en-GB"/>
           </a:p>
@@ -2937,7 +2943,7 @@
           <a:p>
             <a:fld id="{67F33658-59C4-4468-8AD9-203567349AEB}" type="datetimeFigureOut">
               <a:rPr lang="en-GB" smtClean="0"/>
-              <a:t>11/07/2022</a:t>
+              <a:t>12/07/2022</a:t>
             </a:fld>
             <a:endParaRPr lang="en-GB"/>
           </a:p>
@@ -3359,15 +3365,43 @@
           <p:cNvPr id="2" name="Title 1">
             <a:extLst>
               <a:ext uri="{FF2B5EF4-FFF2-40B4-BE49-F238E27FC236}">
-                <a16:creationId xmlns:a16="http://schemas.microsoft.com/office/drawing/2014/main" id="{76AF6D41-5AD6-C938-C25A-ADCA8EC2442D}"/>
-              </a:ext>
-            </a:extLst>
-          </p:cNvPr>
-          <p:cNvSpPr>
-            <a:spLocks noGrp="1"/>
-          </p:cNvSpPr>
-          <p:nvPr>
-            <p:ph type="ctrTitle"/>
+                <a16:creationId xmlns:a16="http://schemas.microsoft.com/office/drawing/2014/main" id="{0FBEB84F-5CAE-923D-5DFE-18275FB6A923}"/>
+              </a:ext>
+            </a:extLst>
+          </p:cNvPr>
+          <p:cNvSpPr>
+            <a:spLocks noGrp="1"/>
+          </p:cNvSpPr>
+          <p:nvPr>
+            <p:ph type="title"/>
+          </p:nvPr>
+        </p:nvSpPr>
+        <p:spPr/>
+        <p:txBody>
+          <a:bodyPr/>
+          <a:lstStyle/>
+          <a:p>
+            <a:r>
+              <a:rPr lang="en-GB" dirty="0"/>
+              <a:t>1 minute uninterrupted gameplay</a:t>
+            </a:r>
+          </a:p>
+        </p:txBody>
+      </p:sp>
+      <p:sp>
+        <p:nvSpPr>
+          <p:cNvPr id="3" name="Content Placeholder 2">
+            <a:extLst>
+              <a:ext uri="{FF2B5EF4-FFF2-40B4-BE49-F238E27FC236}">
+                <a16:creationId xmlns:a16="http://schemas.microsoft.com/office/drawing/2014/main" id="{B9D49C66-2113-E6B5-0FB5-CB51A4C49B91}"/>
+              </a:ext>
+            </a:extLst>
+          </p:cNvPr>
+          <p:cNvSpPr>
+            <a:spLocks noGrp="1"/>
+          </p:cNvSpPr>
+          <p:nvPr>
+            <p:ph idx="1"/>
           </p:nvPr>
         </p:nvSpPr>
         <p:spPr/>
@@ -3376,38 +3410,467 @@
           <a:lstStyle/>
           <a:p>
             <a:endParaRPr lang="en-GB" dirty="0"/>
-          </a:p>
-        </p:txBody>
-      </p:sp>
-      <p:sp>
-        <p:nvSpPr>
-          <p:cNvPr id="3" name="Subtitle 2">
-            <a:extLst>
-              <a:ext uri="{FF2B5EF4-FFF2-40B4-BE49-F238E27FC236}">
-                <a16:creationId xmlns:a16="http://schemas.microsoft.com/office/drawing/2014/main" id="{41A78A78-027E-7248-077D-D66C377E8EBF}"/>
-              </a:ext>
-            </a:extLst>
-          </p:cNvPr>
-          <p:cNvSpPr>
-            <a:spLocks noGrp="1"/>
-          </p:cNvSpPr>
-          <p:nvPr>
-            <p:ph type="subTitle" idx="1"/>
-          </p:nvPr>
-        </p:nvSpPr>
-        <p:spPr/>
-        <p:txBody>
-          <a:bodyPr/>
-          <a:lstStyle/>
-          <a:p>
-            <a:endParaRPr lang="en-GB"/>
           </a:p>
         </p:txBody>
       </p:sp>
     </p:spTree>
     <p:extLst>
       <p:ext uri="{BB962C8B-B14F-4D97-AF65-F5344CB8AC3E}">
-        <p14:creationId xmlns:p14="http://schemas.microsoft.com/office/powerpoint/2010/main" val="1904188823"/>
+        <p14:creationId xmlns:p14="http://schemas.microsoft.com/office/powerpoint/2010/main" val="1923194837"/>
+      </p:ext>
+    </p:extLst>
+  </p:cSld>
+  <p:clrMapOvr>
+    <a:masterClrMapping/>
+  </p:clrMapOvr>
+</p:sld>
+</file>
+
+<file path=ppt/slides/slide10.xml><?xml version="1.0" encoding="utf-8"?>
+<p:sld xmlns:a="http://schemas.openxmlformats.org/drawingml/2006/main" xmlns:r="http://schemas.openxmlformats.org/officeDocument/2006/relationships" xmlns:p="http://schemas.openxmlformats.org/presentationml/2006/main">
+  <p:cSld>
+    <p:spTree>
+      <p:nvGrpSpPr>
+        <p:cNvPr id="1" name=""/>
+        <p:cNvGrpSpPr/>
+        <p:nvPr/>
+      </p:nvGrpSpPr>
+      <p:grpSpPr>
+        <a:xfrm>
+          <a:off x="0" y="0"/>
+          <a:ext cx="0" cy="0"/>
+          <a:chOff x="0" y="0"/>
+          <a:chExt cx="0" cy="0"/>
+        </a:xfrm>
+      </p:grpSpPr>
+      <p:sp>
+        <p:nvSpPr>
+          <p:cNvPr id="2" name="Title 1">
+            <a:extLst>
+              <a:ext uri="{FF2B5EF4-FFF2-40B4-BE49-F238E27FC236}">
+                <a16:creationId xmlns:a16="http://schemas.microsoft.com/office/drawing/2014/main" id="{517A185A-BADB-E76B-3D0B-30C6F43AB7D4}"/>
+              </a:ext>
+            </a:extLst>
+          </p:cNvPr>
+          <p:cNvSpPr>
+            <a:spLocks noGrp="1"/>
+          </p:cNvSpPr>
+          <p:nvPr>
+            <p:ph type="title"/>
+          </p:nvPr>
+        </p:nvSpPr>
+        <p:spPr/>
+        <p:txBody>
+          <a:bodyPr/>
+          <a:lstStyle/>
+          <a:p>
+            <a:r>
+              <a:rPr lang="en-GB" dirty="0"/>
+              <a:t>Sound -</a:t>
+            </a:r>
+            <a:r>
+              <a:rPr lang="en-GB" dirty="0" err="1"/>
+              <a:t>Fmod</a:t>
+            </a:r>
+            <a:endParaRPr lang="en-GB" dirty="0"/>
+          </a:p>
+        </p:txBody>
+      </p:sp>
+      <p:sp>
+        <p:nvSpPr>
+          <p:cNvPr id="3" name="Content Placeholder 2">
+            <a:extLst>
+              <a:ext uri="{FF2B5EF4-FFF2-40B4-BE49-F238E27FC236}">
+                <a16:creationId xmlns:a16="http://schemas.microsoft.com/office/drawing/2014/main" id="{5E25EAE8-82A6-01BE-EC08-DAAA25F58E47}"/>
+              </a:ext>
+            </a:extLst>
+          </p:cNvPr>
+          <p:cNvSpPr>
+            <a:spLocks noGrp="1"/>
+          </p:cNvSpPr>
+          <p:nvPr>
+            <p:ph idx="1"/>
+          </p:nvPr>
+        </p:nvSpPr>
+        <p:spPr/>
+        <p:txBody>
+          <a:bodyPr/>
+          <a:lstStyle/>
+          <a:p>
+            <a:r>
+              <a:rPr lang="en-GB" dirty="0"/>
+              <a:t>Talk about code</a:t>
+            </a:r>
+          </a:p>
+          <a:p>
+            <a:pPr lvl="1"/>
+            <a:r>
+              <a:rPr lang="en-GB" dirty="0"/>
+              <a:t>Audio between levels saved using </a:t>
+            </a:r>
+            <a:r>
+              <a:rPr lang="en-GB"/>
+              <a:t>fmod</a:t>
+            </a:r>
+            <a:endParaRPr lang="en-GB" dirty="0"/>
+          </a:p>
+          <a:p>
+            <a:pPr lvl="1"/>
+            <a:r>
+              <a:rPr lang="en-GB" dirty="0"/>
+              <a:t>Creating audio in </a:t>
+            </a:r>
+            <a:r>
+              <a:rPr lang="en-GB" dirty="0" err="1"/>
+              <a:t>fmod</a:t>
+            </a:r>
+            <a:endParaRPr lang="en-GB" dirty="0"/>
+          </a:p>
+          <a:p>
+            <a:pPr lvl="1"/>
+            <a:r>
+              <a:rPr lang="en-GB" dirty="0"/>
+              <a:t>Button presses / background sound / all the interacts</a:t>
+            </a:r>
+          </a:p>
+        </p:txBody>
+      </p:sp>
+    </p:spTree>
+    <p:extLst>
+      <p:ext uri="{BB962C8B-B14F-4D97-AF65-F5344CB8AC3E}">
+        <p14:creationId xmlns:p14="http://schemas.microsoft.com/office/powerpoint/2010/main" val="386661145"/>
+      </p:ext>
+    </p:extLst>
+  </p:cSld>
+  <p:clrMapOvr>
+    <a:masterClrMapping/>
+  </p:clrMapOvr>
+</p:sld>
+</file>
+
+<file path=ppt/slides/slide11.xml><?xml version="1.0" encoding="utf-8"?>
+<p:sld xmlns:a="http://schemas.openxmlformats.org/drawingml/2006/main" xmlns:r="http://schemas.openxmlformats.org/officeDocument/2006/relationships" xmlns:p="http://schemas.openxmlformats.org/presentationml/2006/main">
+  <p:cSld>
+    <p:spTree>
+      <p:nvGrpSpPr>
+        <p:cNvPr id="1" name=""/>
+        <p:cNvGrpSpPr/>
+        <p:nvPr/>
+      </p:nvGrpSpPr>
+      <p:grpSpPr>
+        <a:xfrm>
+          <a:off x="0" y="0"/>
+          <a:ext cx="0" cy="0"/>
+          <a:chOff x="0" y="0"/>
+          <a:chExt cx="0" cy="0"/>
+        </a:xfrm>
+      </p:grpSpPr>
+      <p:sp>
+        <p:nvSpPr>
+          <p:cNvPr id="2" name="Title 1">
+            <a:extLst>
+              <a:ext uri="{FF2B5EF4-FFF2-40B4-BE49-F238E27FC236}">
+                <a16:creationId xmlns:a16="http://schemas.microsoft.com/office/drawing/2014/main" id="{BFFD0300-DD02-F660-154D-C610EB7EC977}"/>
+              </a:ext>
+            </a:extLst>
+          </p:cNvPr>
+          <p:cNvSpPr>
+            <a:spLocks noGrp="1"/>
+          </p:cNvSpPr>
+          <p:nvPr>
+            <p:ph type="title"/>
+          </p:nvPr>
+        </p:nvSpPr>
+        <p:spPr/>
+        <p:txBody>
+          <a:bodyPr/>
+          <a:lstStyle/>
+          <a:p>
+            <a:r>
+              <a:rPr lang="en-GB" dirty="0"/>
+              <a:t>Implementation</a:t>
+            </a:r>
+          </a:p>
+        </p:txBody>
+      </p:sp>
+      <p:sp>
+        <p:nvSpPr>
+          <p:cNvPr id="3" name="Content Placeholder 2">
+            <a:extLst>
+              <a:ext uri="{FF2B5EF4-FFF2-40B4-BE49-F238E27FC236}">
+                <a16:creationId xmlns:a16="http://schemas.microsoft.com/office/drawing/2014/main" id="{B3A0821A-E458-DC8C-7776-D0674DB7CD17}"/>
+              </a:ext>
+            </a:extLst>
+          </p:cNvPr>
+          <p:cNvSpPr>
+            <a:spLocks noGrp="1"/>
+          </p:cNvSpPr>
+          <p:nvPr>
+            <p:ph idx="1"/>
+          </p:nvPr>
+        </p:nvSpPr>
+        <p:spPr/>
+        <p:txBody>
+          <a:bodyPr/>
+          <a:lstStyle/>
+          <a:p>
+            <a:endParaRPr lang="en-GB"/>
+          </a:p>
+        </p:txBody>
+      </p:sp>
+    </p:spTree>
+    <p:extLst>
+      <p:ext uri="{BB962C8B-B14F-4D97-AF65-F5344CB8AC3E}">
+        <p14:creationId xmlns:p14="http://schemas.microsoft.com/office/powerpoint/2010/main" val="4217783890"/>
+      </p:ext>
+    </p:extLst>
+  </p:cSld>
+  <p:clrMapOvr>
+    <a:masterClrMapping/>
+  </p:clrMapOvr>
+</p:sld>
+</file>
+
+<file path=ppt/slides/slide12.xml><?xml version="1.0" encoding="utf-8"?>
+<p:sld xmlns:a="http://schemas.openxmlformats.org/drawingml/2006/main" xmlns:r="http://schemas.openxmlformats.org/officeDocument/2006/relationships" xmlns:p="http://schemas.openxmlformats.org/presentationml/2006/main">
+  <p:cSld>
+    <p:spTree>
+      <p:nvGrpSpPr>
+        <p:cNvPr id="1" name=""/>
+        <p:cNvGrpSpPr/>
+        <p:nvPr/>
+      </p:nvGrpSpPr>
+      <p:grpSpPr>
+        <a:xfrm>
+          <a:off x="0" y="0"/>
+          <a:ext cx="0" cy="0"/>
+          <a:chOff x="0" y="0"/>
+          <a:chExt cx="0" cy="0"/>
+        </a:xfrm>
+      </p:grpSpPr>
+      <p:sp>
+        <p:nvSpPr>
+          <p:cNvPr id="2" name="Title 1">
+            <a:extLst>
+              <a:ext uri="{FF2B5EF4-FFF2-40B4-BE49-F238E27FC236}">
+                <a16:creationId xmlns:a16="http://schemas.microsoft.com/office/drawing/2014/main" id="{FE8A8AE6-558F-197D-AE54-45B2B9328DAD}"/>
+              </a:ext>
+            </a:extLst>
+          </p:cNvPr>
+          <p:cNvSpPr>
+            <a:spLocks noGrp="1"/>
+          </p:cNvSpPr>
+          <p:nvPr>
+            <p:ph type="title"/>
+          </p:nvPr>
+        </p:nvSpPr>
+        <p:spPr/>
+        <p:txBody>
+          <a:bodyPr/>
+          <a:lstStyle/>
+          <a:p>
+            <a:r>
+              <a:rPr lang="en-GB" dirty="0"/>
+              <a:t>Level selector</a:t>
+            </a:r>
+          </a:p>
+        </p:txBody>
+      </p:sp>
+      <p:sp>
+        <p:nvSpPr>
+          <p:cNvPr id="3" name="Content Placeholder 2">
+            <a:extLst>
+              <a:ext uri="{FF2B5EF4-FFF2-40B4-BE49-F238E27FC236}">
+                <a16:creationId xmlns:a16="http://schemas.microsoft.com/office/drawing/2014/main" id="{84CB0C11-6827-2232-C59B-338DA1823A38}"/>
+              </a:ext>
+            </a:extLst>
+          </p:cNvPr>
+          <p:cNvSpPr>
+            <a:spLocks noGrp="1"/>
+          </p:cNvSpPr>
+          <p:nvPr>
+            <p:ph idx="1"/>
+          </p:nvPr>
+        </p:nvSpPr>
+        <p:spPr/>
+        <p:txBody>
+          <a:bodyPr/>
+          <a:lstStyle/>
+          <a:p>
+            <a:endParaRPr lang="en-GB"/>
+          </a:p>
+        </p:txBody>
+      </p:sp>
+    </p:spTree>
+    <p:extLst>
+      <p:ext uri="{BB962C8B-B14F-4D97-AF65-F5344CB8AC3E}">
+        <p14:creationId xmlns:p14="http://schemas.microsoft.com/office/powerpoint/2010/main" val="2895590290"/>
+      </p:ext>
+    </p:extLst>
+  </p:cSld>
+  <p:clrMapOvr>
+    <a:masterClrMapping/>
+  </p:clrMapOvr>
+</p:sld>
+</file>
+
+<file path=ppt/slides/slide13.xml><?xml version="1.0" encoding="utf-8"?>
+<p:sld xmlns:a="http://schemas.openxmlformats.org/drawingml/2006/main" xmlns:r="http://schemas.openxmlformats.org/officeDocument/2006/relationships" xmlns:p="http://schemas.openxmlformats.org/presentationml/2006/main">
+  <p:cSld>
+    <p:spTree>
+      <p:nvGrpSpPr>
+        <p:cNvPr id="1" name=""/>
+        <p:cNvGrpSpPr/>
+        <p:nvPr/>
+      </p:nvGrpSpPr>
+      <p:grpSpPr>
+        <a:xfrm>
+          <a:off x="0" y="0"/>
+          <a:ext cx="0" cy="0"/>
+          <a:chOff x="0" y="0"/>
+          <a:chExt cx="0" cy="0"/>
+        </a:xfrm>
+      </p:grpSpPr>
+      <p:sp>
+        <p:nvSpPr>
+          <p:cNvPr id="2" name="Title 1">
+            <a:extLst>
+              <a:ext uri="{FF2B5EF4-FFF2-40B4-BE49-F238E27FC236}">
+                <a16:creationId xmlns:a16="http://schemas.microsoft.com/office/drawing/2014/main" id="{C523C11C-B8E0-333A-9ACC-EF4F6ADBBC43}"/>
+              </a:ext>
+            </a:extLst>
+          </p:cNvPr>
+          <p:cNvSpPr>
+            <a:spLocks noGrp="1"/>
+          </p:cNvSpPr>
+          <p:nvPr>
+            <p:ph type="title"/>
+          </p:nvPr>
+        </p:nvSpPr>
+        <p:spPr/>
+        <p:txBody>
+          <a:bodyPr/>
+          <a:lstStyle/>
+          <a:p>
+            <a:r>
+              <a:rPr lang="en-GB" dirty="0"/>
+              <a:t>User Interface</a:t>
+            </a:r>
+          </a:p>
+        </p:txBody>
+      </p:sp>
+      <p:sp>
+        <p:nvSpPr>
+          <p:cNvPr id="3" name="Content Placeholder 2">
+            <a:extLst>
+              <a:ext uri="{FF2B5EF4-FFF2-40B4-BE49-F238E27FC236}">
+                <a16:creationId xmlns:a16="http://schemas.microsoft.com/office/drawing/2014/main" id="{4042B694-A16E-E56A-383E-ACE68514E234}"/>
+              </a:ext>
+            </a:extLst>
+          </p:cNvPr>
+          <p:cNvSpPr>
+            <a:spLocks noGrp="1"/>
+          </p:cNvSpPr>
+          <p:nvPr>
+            <p:ph idx="1"/>
+          </p:nvPr>
+        </p:nvSpPr>
+        <p:spPr/>
+        <p:txBody>
+          <a:bodyPr/>
+          <a:lstStyle/>
+          <a:p>
+            <a:endParaRPr lang="en-GB"/>
+          </a:p>
+        </p:txBody>
+      </p:sp>
+    </p:spTree>
+    <p:extLst>
+      <p:ext uri="{BB962C8B-B14F-4D97-AF65-F5344CB8AC3E}">
+        <p14:creationId xmlns:p14="http://schemas.microsoft.com/office/powerpoint/2010/main" val="211174556"/>
+      </p:ext>
+    </p:extLst>
+  </p:cSld>
+  <p:clrMapOvr>
+    <a:masterClrMapping/>
+  </p:clrMapOvr>
+</p:sld>
+</file>
+
+<file path=ppt/slides/slide14.xml><?xml version="1.0" encoding="utf-8"?>
+<p:sld xmlns:a="http://schemas.openxmlformats.org/drawingml/2006/main" xmlns:r="http://schemas.openxmlformats.org/officeDocument/2006/relationships" xmlns:p="http://schemas.openxmlformats.org/presentationml/2006/main">
+  <p:cSld>
+    <p:spTree>
+      <p:nvGrpSpPr>
+        <p:cNvPr id="1" name=""/>
+        <p:cNvGrpSpPr/>
+        <p:nvPr/>
+      </p:nvGrpSpPr>
+      <p:grpSpPr>
+        <a:xfrm>
+          <a:off x="0" y="0"/>
+          <a:ext cx="0" cy="0"/>
+          <a:chOff x="0" y="0"/>
+          <a:chExt cx="0" cy="0"/>
+        </a:xfrm>
+      </p:grpSpPr>
+      <p:sp>
+        <p:nvSpPr>
+          <p:cNvPr id="2" name="Title 1">
+            <a:extLst>
+              <a:ext uri="{FF2B5EF4-FFF2-40B4-BE49-F238E27FC236}">
+                <a16:creationId xmlns:a16="http://schemas.microsoft.com/office/drawing/2014/main" id="{1AD24733-945A-07DC-14DC-484722736C44}"/>
+              </a:ext>
+            </a:extLst>
+          </p:cNvPr>
+          <p:cNvSpPr>
+            <a:spLocks noGrp="1"/>
+          </p:cNvSpPr>
+          <p:nvPr>
+            <p:ph type="title"/>
+          </p:nvPr>
+        </p:nvSpPr>
+        <p:spPr/>
+        <p:txBody>
+          <a:bodyPr/>
+          <a:lstStyle/>
+          <a:p>
+            <a:r>
+              <a:rPr lang="en-GB" dirty="0"/>
+              <a:t>Pong AR game</a:t>
+            </a:r>
+          </a:p>
+        </p:txBody>
+      </p:sp>
+      <p:sp>
+        <p:nvSpPr>
+          <p:cNvPr id="3" name="Content Placeholder 2">
+            <a:extLst>
+              <a:ext uri="{FF2B5EF4-FFF2-40B4-BE49-F238E27FC236}">
+                <a16:creationId xmlns:a16="http://schemas.microsoft.com/office/drawing/2014/main" id="{347F6F85-227C-ADDD-A754-13957F9ACE4B}"/>
+              </a:ext>
+            </a:extLst>
+          </p:cNvPr>
+          <p:cNvSpPr>
+            <a:spLocks noGrp="1"/>
+          </p:cNvSpPr>
+          <p:nvPr>
+            <p:ph idx="1"/>
+          </p:nvPr>
+        </p:nvSpPr>
+        <p:spPr/>
+        <p:txBody>
+          <a:bodyPr/>
+          <a:lstStyle/>
+          <a:p>
+            <a:endParaRPr lang="en-GB"/>
+          </a:p>
+        </p:txBody>
+      </p:sp>
+    </p:spTree>
+    <p:extLst>
+      <p:ext uri="{BB962C8B-B14F-4D97-AF65-F5344CB8AC3E}">
+        <p14:creationId xmlns:p14="http://schemas.microsoft.com/office/powerpoint/2010/main" val="2267406026"/>
       </p:ext>
     </p:extLst>
   </p:cSld>
@@ -3439,7 +3902,7 @@
           <p:cNvPr id="2" name="Title 1">
             <a:extLst>
               <a:ext uri="{FF2B5EF4-FFF2-40B4-BE49-F238E27FC236}">
-                <a16:creationId xmlns:a16="http://schemas.microsoft.com/office/drawing/2014/main" id="{D0D19A46-DBE9-1955-6405-C52C5EED68A9}"/>
+                <a16:creationId xmlns:a16="http://schemas.microsoft.com/office/drawing/2014/main" id="{800DF20D-E94F-01A2-1636-976C10E1C9B6}"/>
               </a:ext>
             </a:extLst>
           </p:cNvPr>
@@ -3457,7 +3920,7 @@
           <a:p>
             <a:r>
               <a:rPr lang="en-GB" dirty="0"/>
-              <a:t>Libraries / Frameworks</a:t>
+              <a:t>Introduction</a:t>
             </a:r>
           </a:p>
         </p:txBody>
@@ -3467,7 +3930,7 @@
           <p:cNvPr id="3" name="Content Placeholder 2">
             <a:extLst>
               <a:ext uri="{FF2B5EF4-FFF2-40B4-BE49-F238E27FC236}">
-                <a16:creationId xmlns:a16="http://schemas.microsoft.com/office/drawing/2014/main" id="{6BA627A4-6A5F-AE1C-2EF0-AF7BEA71B59B}"/>
+                <a16:creationId xmlns:a16="http://schemas.microsoft.com/office/drawing/2014/main" id="{DEE32CA0-4C3E-B293-49D8-80CE5554CA8E}"/>
               </a:ext>
             </a:extLst>
           </p:cNvPr>
@@ -3490,7 +3953,7 @@
     </p:spTree>
     <p:extLst>
       <p:ext uri="{BB962C8B-B14F-4D97-AF65-F5344CB8AC3E}">
-        <p14:creationId xmlns:p14="http://schemas.microsoft.com/office/powerpoint/2010/main" val="2877349472"/>
+        <p14:creationId xmlns:p14="http://schemas.microsoft.com/office/powerpoint/2010/main" val="2384385478"/>
       </p:ext>
     </p:extLst>
   </p:cSld>
@@ -3522,15 +3985,15 @@
           <p:cNvPr id="2" name="Title 1">
             <a:extLst>
               <a:ext uri="{FF2B5EF4-FFF2-40B4-BE49-F238E27FC236}">
-                <a16:creationId xmlns:a16="http://schemas.microsoft.com/office/drawing/2014/main" id="{3131930F-4C4B-BE6D-B564-4556470DFA48}"/>
-              </a:ext>
-            </a:extLst>
-          </p:cNvPr>
-          <p:cNvSpPr>
-            <a:spLocks noGrp="1"/>
-          </p:cNvSpPr>
-          <p:nvPr>
-            <p:ph type="title"/>
+                <a16:creationId xmlns:a16="http://schemas.microsoft.com/office/drawing/2014/main" id="{76AF6D41-5AD6-C938-C25A-ADCA8EC2442D}"/>
+              </a:ext>
+            </a:extLst>
+          </p:cNvPr>
+          <p:cNvSpPr>
+            <a:spLocks noGrp="1"/>
+          </p:cNvSpPr>
+          <p:nvPr>
+            <p:ph type="ctrTitle"/>
           </p:nvPr>
         </p:nvSpPr>
         <p:spPr/>
@@ -3540,25 +4003,25 @@
           <a:p>
             <a:r>
               <a:rPr lang="en-GB" dirty="0"/>
-              <a:t>Unity Gaming Services | Analytics</a:t>
-            </a:r>
-          </a:p>
-        </p:txBody>
-      </p:sp>
-      <p:sp>
-        <p:nvSpPr>
-          <p:cNvPr id="3" name="Content Placeholder 2">
-            <a:extLst>
-              <a:ext uri="{FF2B5EF4-FFF2-40B4-BE49-F238E27FC236}">
-                <a16:creationId xmlns:a16="http://schemas.microsoft.com/office/drawing/2014/main" id="{EE47D1AC-8453-7196-349F-0D84FAFF05F3}"/>
-              </a:ext>
-            </a:extLst>
-          </p:cNvPr>
-          <p:cNvSpPr>
-            <a:spLocks noGrp="1"/>
-          </p:cNvSpPr>
-          <p:nvPr>
-            <p:ph idx="1"/>
+              <a:t>Elevator Pitch section</a:t>
+            </a:r>
+          </a:p>
+        </p:txBody>
+      </p:sp>
+      <p:sp>
+        <p:nvSpPr>
+          <p:cNvPr id="3" name="Subtitle 2">
+            <a:extLst>
+              <a:ext uri="{FF2B5EF4-FFF2-40B4-BE49-F238E27FC236}">
+                <a16:creationId xmlns:a16="http://schemas.microsoft.com/office/drawing/2014/main" id="{41A78A78-027E-7248-077D-D66C377E8EBF}"/>
+              </a:ext>
+            </a:extLst>
+          </p:cNvPr>
+          <p:cNvSpPr>
+            <a:spLocks noGrp="1"/>
+          </p:cNvSpPr>
+          <p:nvPr>
+            <p:ph type="subTitle" idx="1"/>
           </p:nvPr>
         </p:nvSpPr>
         <p:spPr/>
@@ -3573,7 +4036,7 @@
     </p:spTree>
     <p:extLst>
       <p:ext uri="{BB962C8B-B14F-4D97-AF65-F5344CB8AC3E}">
-        <p14:creationId xmlns:p14="http://schemas.microsoft.com/office/powerpoint/2010/main" val="2047714991"/>
+        <p14:creationId xmlns:p14="http://schemas.microsoft.com/office/powerpoint/2010/main" val="1904188823"/>
       </p:ext>
     </p:extLst>
   </p:cSld>
@@ -3586,6 +4049,14 @@
 <file path=ppt/slides/slide4.xml><?xml version="1.0" encoding="utf-8"?>
 <p:sld xmlns:a="http://schemas.openxmlformats.org/drawingml/2006/main" xmlns:r="http://schemas.openxmlformats.org/officeDocument/2006/relationships" xmlns:p="http://schemas.openxmlformats.org/presentationml/2006/main">
   <p:cSld>
+    <p:bg>
+      <p:bgPr>
+        <a:solidFill>
+          <a:schemeClr val="bg1"/>
+        </a:solidFill>
+        <a:effectLst/>
+      </p:bgPr>
+    </p:bg>
     <p:spTree>
       <p:nvGrpSpPr>
         <p:cNvPr id="1" name=""/>
@@ -3600,12 +4071,463 @@
           <a:chExt cx="0" cy="0"/>
         </a:xfrm>
       </p:grpSpPr>
+      <p:sp useBgFill="1">
+        <p:nvSpPr>
+          <p:cNvPr id="7" name="Rectangle 6">
+            <a:extLst>
+              <a:ext uri="{FF2B5EF4-FFF2-40B4-BE49-F238E27FC236}">
+                <a16:creationId xmlns:a16="http://schemas.microsoft.com/office/drawing/2014/main" id="{FFD48BC7-DC40-47DE-87EE-9F4B6ECB9ABB}"/>
+              </a:ext>
+              <a:ext uri="{C183D7F6-B498-43B3-948B-1728B52AA6E4}">
+                <adec:decorative xmlns:adec="http://schemas.microsoft.com/office/drawing/2017/decorative" val="1"/>
+              </a:ext>
+            </a:extLst>
+          </p:cNvPr>
+          <p:cNvSpPr>
+            <a:spLocks noGrp="1" noRot="1" noChangeAspect="1" noMove="1" noResize="1" noEditPoints="1" noAdjustHandles="1" noChangeArrowheads="1" noChangeShapeType="1" noTextEdit="1"/>
+          </p:cNvSpPr>
+          <p:nvPr>
+            <p:extLst>
+              <p:ext uri="{386F3935-93C4-4BCD-93E2-E3B085C9AB24}">
+                <p16:designElem xmlns:p16="http://schemas.microsoft.com/office/powerpoint/2015/main" val="1"/>
+              </p:ext>
+            </p:extLst>
+          </p:nvPr>
+        </p:nvSpPr>
+        <p:spPr>
+          <a:xfrm>
+            <a:off x="0" y="0"/>
+            <a:ext cx="12192000" cy="6858000"/>
+          </a:xfrm>
+          <a:prstGeom prst="rect">
+            <a:avLst/>
+          </a:prstGeom>
+          <a:ln>
+            <a:noFill/>
+          </a:ln>
+        </p:spPr>
+        <p:style>
+          <a:lnRef idx="2">
+            <a:schemeClr val="accent1">
+              <a:shade val="50000"/>
+            </a:schemeClr>
+          </a:lnRef>
+          <a:fillRef idx="1">
+            <a:schemeClr val="accent1"/>
+          </a:fillRef>
+          <a:effectRef idx="0">
+            <a:schemeClr val="accent1"/>
+          </a:effectRef>
+          <a:fontRef idx="minor">
+            <a:schemeClr val="lt1"/>
+          </a:fontRef>
+        </p:style>
+        <p:txBody>
+          <a:bodyPr rtlCol="0" anchor="ctr"/>
+          <a:lstStyle/>
+          <a:p>
+            <a:pPr algn="ctr"/>
+            <a:endParaRPr lang="en-US"/>
+          </a:p>
+        </p:txBody>
+      </p:sp>
+      <p:sp useBgFill="1">
+        <p:nvSpPr>
+          <p:cNvPr id="9" name="Freeform: Shape 8">
+            <a:extLst>
+              <a:ext uri="{FF2B5EF4-FFF2-40B4-BE49-F238E27FC236}">
+                <a16:creationId xmlns:a16="http://schemas.microsoft.com/office/drawing/2014/main" id="{E502BBC7-2C76-46F3-BC24-5985BC13DB88}"/>
+              </a:ext>
+              <a:ext uri="{C183D7F6-B498-43B3-948B-1728B52AA6E4}">
+                <adec:decorative xmlns:adec="http://schemas.microsoft.com/office/drawing/2017/decorative" val="1"/>
+              </a:ext>
+            </a:extLst>
+          </p:cNvPr>
+          <p:cNvSpPr>
+            <a:spLocks noGrp="1" noRot="1" noChangeAspect="1" noMove="1" noResize="1" noEditPoints="1" noAdjustHandles="1" noChangeArrowheads="1" noChangeShapeType="1" noTextEdit="1"/>
+          </p:cNvSpPr>
+          <p:nvPr>
+            <p:extLst>
+              <p:ext uri="{386F3935-93C4-4BCD-93E2-E3B085C9AB24}">
+                <p16:designElem xmlns:p16="http://schemas.microsoft.com/office/powerpoint/2015/main" val="1"/>
+              </p:ext>
+            </p:extLst>
+          </p:nvPr>
+        </p:nvSpPr>
+        <p:spPr>
+          <a:xfrm>
+            <a:off x="1114425" y="0"/>
+            <a:ext cx="9963150" cy="6858000"/>
+          </a:xfrm>
+          <a:custGeom>
+            <a:avLst/>
+            <a:gdLst>
+              <a:gd name="connsiteX0" fmla="*/ 1595771 w 9963150"/>
+              <a:gd name="connsiteY0" fmla="*/ 0 h 6858000"/>
+              <a:gd name="connsiteX1" fmla="*/ 8367379 w 9963150"/>
+              <a:gd name="connsiteY1" fmla="*/ 0 h 6858000"/>
+              <a:gd name="connsiteX2" fmla="*/ 8504080 w 9963150"/>
+              <a:gd name="connsiteY2" fmla="*/ 130333 h 6858000"/>
+              <a:gd name="connsiteX3" fmla="*/ 9963150 w 9963150"/>
+              <a:gd name="connsiteY3" fmla="*/ 3652838 h 6858000"/>
+              <a:gd name="connsiteX4" fmla="*/ 8825600 w 9963150"/>
+              <a:gd name="connsiteY4" fmla="*/ 6821583 h 6858000"/>
+              <a:gd name="connsiteX5" fmla="*/ 8794055 w 9963150"/>
+              <a:gd name="connsiteY5" fmla="*/ 6858000 h 6858000"/>
+              <a:gd name="connsiteX6" fmla="*/ 1169096 w 9963150"/>
+              <a:gd name="connsiteY6" fmla="*/ 6858000 h 6858000"/>
+              <a:gd name="connsiteX7" fmla="*/ 1137550 w 9963150"/>
+              <a:gd name="connsiteY7" fmla="*/ 6821583 h 6858000"/>
+              <a:gd name="connsiteX8" fmla="*/ 0 w 9963150"/>
+              <a:gd name="connsiteY8" fmla="*/ 3652838 h 6858000"/>
+              <a:gd name="connsiteX9" fmla="*/ 1459070 w 9963150"/>
+              <a:gd name="connsiteY9" fmla="*/ 130333 h 6858000"/>
+            </a:gdLst>
+            <a:ahLst/>
+            <a:cxnLst>
+              <a:cxn ang="0">
+                <a:pos x="connsiteX0" y="connsiteY0"/>
+              </a:cxn>
+              <a:cxn ang="0">
+                <a:pos x="connsiteX1" y="connsiteY1"/>
+              </a:cxn>
+              <a:cxn ang="0">
+                <a:pos x="connsiteX2" y="connsiteY2"/>
+              </a:cxn>
+              <a:cxn ang="0">
+                <a:pos x="connsiteX3" y="connsiteY3"/>
+              </a:cxn>
+              <a:cxn ang="0">
+                <a:pos x="connsiteX4" y="connsiteY4"/>
+              </a:cxn>
+              <a:cxn ang="0">
+                <a:pos x="connsiteX5" y="connsiteY5"/>
+              </a:cxn>
+              <a:cxn ang="0">
+                <a:pos x="connsiteX6" y="connsiteY6"/>
+              </a:cxn>
+              <a:cxn ang="0">
+                <a:pos x="connsiteX7" y="connsiteY7"/>
+              </a:cxn>
+              <a:cxn ang="0">
+                <a:pos x="connsiteX8" y="connsiteY8"/>
+              </a:cxn>
+              <a:cxn ang="0">
+                <a:pos x="connsiteX9" y="connsiteY9"/>
+              </a:cxn>
+            </a:cxnLst>
+            <a:rect l="l" t="t" r="r" b="b"/>
+            <a:pathLst>
+              <a:path w="9963150" h="6858000">
+                <a:moveTo>
+                  <a:pt x="1595771" y="0"/>
+                </a:moveTo>
+                <a:lnTo>
+                  <a:pt x="8367379" y="0"/>
+                </a:lnTo>
+                <a:lnTo>
+                  <a:pt x="8504080" y="130333"/>
+                </a:lnTo>
+                <a:cubicBezTo>
+                  <a:pt x="9405568" y="1031820"/>
+                  <a:pt x="9963150" y="2277214"/>
+                  <a:pt x="9963150" y="3652838"/>
+                </a:cubicBezTo>
+                <a:cubicBezTo>
+                  <a:pt x="9963150" y="4856509"/>
+                  <a:pt x="9536251" y="5960473"/>
+                  <a:pt x="8825600" y="6821583"/>
+                </a:cubicBezTo>
+                <a:lnTo>
+                  <a:pt x="8794055" y="6858000"/>
+                </a:lnTo>
+                <a:lnTo>
+                  <a:pt x="1169096" y="6858000"/>
+                </a:lnTo>
+                <a:lnTo>
+                  <a:pt x="1137550" y="6821583"/>
+                </a:lnTo>
+                <a:cubicBezTo>
+                  <a:pt x="426899" y="5960473"/>
+                  <a:pt x="0" y="4856509"/>
+                  <a:pt x="0" y="3652838"/>
+                </a:cubicBezTo>
+                <a:cubicBezTo>
+                  <a:pt x="0" y="2277214"/>
+                  <a:pt x="557582" y="1031820"/>
+                  <a:pt x="1459070" y="130333"/>
+                </a:cubicBezTo>
+                <a:close/>
+              </a:path>
+            </a:pathLst>
+          </a:custGeom>
+          <a:ln w="9525">
+            <a:solidFill>
+              <a:srgbClr val="EFEFEF"/>
+            </a:solidFill>
+          </a:ln>
+          <a:effectLst>
+            <a:outerShdw blurRad="139700" sx="102000" sy="102000" algn="ctr" rotWithShape="0">
+              <a:schemeClr val="bg1">
+                <a:lumMod val="85000"/>
+                <a:alpha val="38000"/>
+              </a:schemeClr>
+            </a:outerShdw>
+          </a:effectLst>
+        </p:spPr>
+        <p:style>
+          <a:lnRef idx="2">
+            <a:schemeClr val="accent1">
+              <a:shade val="50000"/>
+            </a:schemeClr>
+          </a:lnRef>
+          <a:fillRef idx="1">
+            <a:schemeClr val="accent1"/>
+          </a:fillRef>
+          <a:effectRef idx="0">
+            <a:schemeClr val="accent1"/>
+          </a:effectRef>
+          <a:fontRef idx="minor">
+            <a:schemeClr val="lt1"/>
+          </a:fontRef>
+        </p:style>
+        <p:txBody>
+          <a:bodyPr wrap="square" rtlCol="0" anchor="ctr">
+            <a:noAutofit/>
+          </a:bodyPr>
+          <a:lstStyle/>
+          <a:p>
+            <a:pPr marL="0" marR="0" lvl="0" indent="0" algn="ctr" defTabSz="914400" rtl="0" eaLnBrk="1" fontAlgn="auto" latinLnBrk="0" hangingPunct="1">
+              <a:lnSpc>
+                <a:spcPct val="100000"/>
+              </a:lnSpc>
+              <a:spcBef>
+                <a:spcPts val="0"/>
+              </a:spcBef>
+              <a:spcAft>
+                <a:spcPts val="0"/>
+              </a:spcAft>
+              <a:buClrTx/>
+              <a:buSzTx/>
+              <a:buFontTx/>
+              <a:buNone/>
+              <a:tabLst/>
+              <a:defRPr/>
+            </a:pPr>
+            <a:endParaRPr kumimoji="0" lang="en-US" sz="1800" b="0" i="0" u="none" strike="noStrike" kern="1200" cap="none" spc="0" normalizeH="0" baseline="0" noProof="0">
+              <a:ln>
+                <a:noFill/>
+              </a:ln>
+              <a:solidFill>
+                <a:prstClr val="white"/>
+              </a:solidFill>
+              <a:effectLst/>
+              <a:uLnTx/>
+              <a:uFillTx/>
+              <a:latin typeface="Calibri" panose="020F0502020204030204"/>
+              <a:ea typeface="+mn-ea"/>
+              <a:cs typeface="+mn-cs"/>
+            </a:endParaRPr>
+          </a:p>
+        </p:txBody>
+      </p:sp>
+      <p:sp useBgFill="1">
+        <p:nvSpPr>
+          <p:cNvPr id="11" name="Freeform: Shape 10">
+            <a:extLst>
+              <a:ext uri="{FF2B5EF4-FFF2-40B4-BE49-F238E27FC236}">
+                <a16:creationId xmlns:a16="http://schemas.microsoft.com/office/drawing/2014/main" id="{C7F28D52-2A5F-4D23-81AE-7CB8B591C7AF}"/>
+              </a:ext>
+              <a:ext uri="{C183D7F6-B498-43B3-948B-1728B52AA6E4}">
+                <adec:decorative xmlns:adec="http://schemas.microsoft.com/office/drawing/2017/decorative" val="1"/>
+              </a:ext>
+            </a:extLst>
+          </p:cNvPr>
+          <p:cNvSpPr>
+            <a:spLocks noGrp="1" noRot="1" noChangeAspect="1" noMove="1" noResize="1" noEditPoints="1" noAdjustHandles="1" noChangeArrowheads="1" noChangeShapeType="1" noTextEdit="1"/>
+          </p:cNvSpPr>
+          <p:nvPr>
+            <p:extLst>
+              <p:ext uri="{386F3935-93C4-4BCD-93E2-E3B085C9AB24}">
+                <p16:designElem xmlns:p16="http://schemas.microsoft.com/office/powerpoint/2015/main" val="1"/>
+              </p:ext>
+            </p:extLst>
+          </p:nvPr>
+        </p:nvSpPr>
+        <p:spPr>
+          <a:xfrm>
+            <a:off x="1121664" y="0"/>
+            <a:ext cx="9948672" cy="6858000"/>
+          </a:xfrm>
+          <a:custGeom>
+            <a:avLst/>
+            <a:gdLst>
+              <a:gd name="connsiteX0" fmla="*/ 1595771 w 9963150"/>
+              <a:gd name="connsiteY0" fmla="*/ 0 h 6858000"/>
+              <a:gd name="connsiteX1" fmla="*/ 8367379 w 9963150"/>
+              <a:gd name="connsiteY1" fmla="*/ 0 h 6858000"/>
+              <a:gd name="connsiteX2" fmla="*/ 8504080 w 9963150"/>
+              <a:gd name="connsiteY2" fmla="*/ 130333 h 6858000"/>
+              <a:gd name="connsiteX3" fmla="*/ 9963150 w 9963150"/>
+              <a:gd name="connsiteY3" fmla="*/ 3652838 h 6858000"/>
+              <a:gd name="connsiteX4" fmla="*/ 8825600 w 9963150"/>
+              <a:gd name="connsiteY4" fmla="*/ 6821583 h 6858000"/>
+              <a:gd name="connsiteX5" fmla="*/ 8794055 w 9963150"/>
+              <a:gd name="connsiteY5" fmla="*/ 6858000 h 6858000"/>
+              <a:gd name="connsiteX6" fmla="*/ 1169096 w 9963150"/>
+              <a:gd name="connsiteY6" fmla="*/ 6858000 h 6858000"/>
+              <a:gd name="connsiteX7" fmla="*/ 1137550 w 9963150"/>
+              <a:gd name="connsiteY7" fmla="*/ 6821583 h 6858000"/>
+              <a:gd name="connsiteX8" fmla="*/ 0 w 9963150"/>
+              <a:gd name="connsiteY8" fmla="*/ 3652838 h 6858000"/>
+              <a:gd name="connsiteX9" fmla="*/ 1459070 w 9963150"/>
+              <a:gd name="connsiteY9" fmla="*/ 130333 h 6858000"/>
+            </a:gdLst>
+            <a:ahLst/>
+            <a:cxnLst>
+              <a:cxn ang="0">
+                <a:pos x="connsiteX0" y="connsiteY0"/>
+              </a:cxn>
+              <a:cxn ang="0">
+                <a:pos x="connsiteX1" y="connsiteY1"/>
+              </a:cxn>
+              <a:cxn ang="0">
+                <a:pos x="connsiteX2" y="connsiteY2"/>
+              </a:cxn>
+              <a:cxn ang="0">
+                <a:pos x="connsiteX3" y="connsiteY3"/>
+              </a:cxn>
+              <a:cxn ang="0">
+                <a:pos x="connsiteX4" y="connsiteY4"/>
+              </a:cxn>
+              <a:cxn ang="0">
+                <a:pos x="connsiteX5" y="connsiteY5"/>
+              </a:cxn>
+              <a:cxn ang="0">
+                <a:pos x="connsiteX6" y="connsiteY6"/>
+              </a:cxn>
+              <a:cxn ang="0">
+                <a:pos x="connsiteX7" y="connsiteY7"/>
+              </a:cxn>
+              <a:cxn ang="0">
+                <a:pos x="connsiteX8" y="connsiteY8"/>
+              </a:cxn>
+              <a:cxn ang="0">
+                <a:pos x="connsiteX9" y="connsiteY9"/>
+              </a:cxn>
+            </a:cxnLst>
+            <a:rect l="l" t="t" r="r" b="b"/>
+            <a:pathLst>
+              <a:path w="9963150" h="6858000">
+                <a:moveTo>
+                  <a:pt x="1595771" y="0"/>
+                </a:moveTo>
+                <a:lnTo>
+                  <a:pt x="8367379" y="0"/>
+                </a:lnTo>
+                <a:lnTo>
+                  <a:pt x="8504080" y="130333"/>
+                </a:lnTo>
+                <a:cubicBezTo>
+                  <a:pt x="9405568" y="1031820"/>
+                  <a:pt x="9963150" y="2277214"/>
+                  <a:pt x="9963150" y="3652838"/>
+                </a:cubicBezTo>
+                <a:cubicBezTo>
+                  <a:pt x="9963150" y="4856509"/>
+                  <a:pt x="9536251" y="5960473"/>
+                  <a:pt x="8825600" y="6821583"/>
+                </a:cubicBezTo>
+                <a:lnTo>
+                  <a:pt x="8794055" y="6858000"/>
+                </a:lnTo>
+                <a:lnTo>
+                  <a:pt x="1169096" y="6858000"/>
+                </a:lnTo>
+                <a:lnTo>
+                  <a:pt x="1137550" y="6821583"/>
+                </a:lnTo>
+                <a:cubicBezTo>
+                  <a:pt x="426899" y="5960473"/>
+                  <a:pt x="0" y="4856509"/>
+                  <a:pt x="0" y="3652838"/>
+                </a:cubicBezTo>
+                <a:cubicBezTo>
+                  <a:pt x="0" y="2277214"/>
+                  <a:pt x="557582" y="1031820"/>
+                  <a:pt x="1459070" y="130333"/>
+                </a:cubicBezTo>
+                <a:close/>
+              </a:path>
+            </a:pathLst>
+          </a:custGeom>
+          <a:ln w="9525">
+            <a:noFill/>
+          </a:ln>
+          <a:effectLst/>
+        </p:spPr>
+        <p:style>
+          <a:lnRef idx="2">
+            <a:schemeClr val="accent1">
+              <a:shade val="50000"/>
+            </a:schemeClr>
+          </a:lnRef>
+          <a:fillRef idx="1">
+            <a:schemeClr val="accent1"/>
+          </a:fillRef>
+          <a:effectRef idx="0">
+            <a:schemeClr val="accent1"/>
+          </a:effectRef>
+          <a:fontRef idx="minor">
+            <a:schemeClr val="lt1"/>
+          </a:fontRef>
+        </p:style>
+        <p:txBody>
+          <a:bodyPr wrap="square" rtlCol="0" anchor="ctr">
+            <a:noAutofit/>
+          </a:bodyPr>
+          <a:lstStyle/>
+          <a:p>
+            <a:pPr marL="0" marR="0" lvl="0" indent="0" algn="ctr" defTabSz="914400" rtl="0" eaLnBrk="1" fontAlgn="auto" latinLnBrk="0" hangingPunct="1">
+              <a:lnSpc>
+                <a:spcPct val="100000"/>
+              </a:lnSpc>
+              <a:spcBef>
+                <a:spcPts val="0"/>
+              </a:spcBef>
+              <a:spcAft>
+                <a:spcPts val="0"/>
+              </a:spcAft>
+              <a:buClrTx/>
+              <a:buSzTx/>
+              <a:buFontTx/>
+              <a:buNone/>
+              <a:tabLst/>
+              <a:defRPr/>
+            </a:pPr>
+            <a:endParaRPr kumimoji="0" lang="en-US" sz="1800" b="0" i="0" u="none" strike="noStrike" kern="1200" cap="none" spc="0" normalizeH="0" baseline="0" noProof="0">
+              <a:ln>
+                <a:noFill/>
+              </a:ln>
+              <a:solidFill>
+                <a:prstClr val="white"/>
+              </a:solidFill>
+              <a:effectLst/>
+              <a:uLnTx/>
+              <a:uFillTx/>
+              <a:latin typeface="Calibri" panose="020F0502020204030204"/>
+              <a:ea typeface="+mn-ea"/>
+              <a:cs typeface="+mn-cs"/>
+            </a:endParaRPr>
+          </a:p>
+        </p:txBody>
+      </p:sp>
       <p:sp>
         <p:nvSpPr>
           <p:cNvPr id="2" name="Title 1">
             <a:extLst>
               <a:ext uri="{FF2B5EF4-FFF2-40B4-BE49-F238E27FC236}">
-                <a16:creationId xmlns:a16="http://schemas.microsoft.com/office/drawing/2014/main" id="{FC9486F3-7E48-4303-20A5-D08ECA0740A5}"/>
+                <a16:creationId xmlns:a16="http://schemas.microsoft.com/office/drawing/2014/main" id="{D0D19A46-DBE9-1955-6405-C52C5EED68A9}"/>
               </a:ext>
             </a:extLst>
           </p:cNvPr>
@@ -3616,47 +4538,129 @@
             <p:ph type="title"/>
           </p:nvPr>
         </p:nvSpPr>
-        <p:spPr/>
-        <p:txBody>
-          <a:bodyPr/>
-          <a:lstStyle/>
-          <a:p>
-            <a:r>
-              <a:rPr lang="en-GB" dirty="0"/>
-              <a:t>Unity Gaming Services | Monetization</a:t>
-            </a:r>
-          </a:p>
-        </p:txBody>
-      </p:sp>
-      <p:sp>
-        <p:nvSpPr>
-          <p:cNvPr id="3" name="Content Placeholder 2">
-            <a:extLst>
-              <a:ext uri="{FF2B5EF4-FFF2-40B4-BE49-F238E27FC236}">
-                <a16:creationId xmlns:a16="http://schemas.microsoft.com/office/drawing/2014/main" id="{A4FE0663-6AA9-48ED-0D41-6430CF4BDA5B}"/>
-              </a:ext>
-            </a:extLst>
-          </p:cNvPr>
-          <p:cNvSpPr>
-            <a:spLocks noGrp="1"/>
-          </p:cNvSpPr>
-          <p:nvPr>
-            <p:ph idx="1"/>
-          </p:nvPr>
-        </p:nvSpPr>
-        <p:spPr/>
-        <p:txBody>
-          <a:bodyPr/>
-          <a:lstStyle/>
-          <a:p>
-            <a:endParaRPr lang="en-GB"/>
+        <p:spPr>
+          <a:xfrm>
+            <a:off x="1524003" y="1999615"/>
+            <a:ext cx="9144000" cy="2764028"/>
+          </a:xfrm>
+        </p:spPr>
+        <p:txBody>
+          <a:bodyPr vert="horz" lIns="91440" tIns="45720" rIns="91440" bIns="45720" rtlCol="0" anchor="ctr">
+            <a:normAutofit/>
+          </a:bodyPr>
+          <a:lstStyle/>
+          <a:p>
+            <a:pPr algn="ctr"/>
+            <a:r>
+              <a:rPr lang="en-US" sz="7200" kern="1200">
+                <a:solidFill>
+                  <a:schemeClr val="tx1"/>
+                </a:solidFill>
+                <a:latin typeface="+mj-lt"/>
+                <a:ea typeface="+mj-ea"/>
+                <a:cs typeface="+mj-cs"/>
+              </a:rPr>
+              <a:t>Libraries / Frameworks</a:t>
+            </a:r>
+          </a:p>
+        </p:txBody>
+      </p:sp>
+      <p:sp>
+        <p:nvSpPr>
+          <p:cNvPr id="13" name="Rectangle 12">
+            <a:extLst>
+              <a:ext uri="{FF2B5EF4-FFF2-40B4-BE49-F238E27FC236}">
+                <a16:creationId xmlns:a16="http://schemas.microsoft.com/office/drawing/2014/main" id="{3629484E-3792-4B3D-89AD-7C8A1ED0E0D4}"/>
+              </a:ext>
+              <a:ext uri="{C183D7F6-B498-43B3-948B-1728B52AA6E4}">
+                <adec:decorative xmlns:adec="http://schemas.microsoft.com/office/drawing/2017/decorative" val="1"/>
+              </a:ext>
+            </a:extLst>
+          </p:cNvPr>
+          <p:cNvSpPr>
+            <a:spLocks noGrp="1" noRot="1" noChangeAspect="1" noMove="1" noResize="1" noEditPoints="1" noAdjustHandles="1" noChangeArrowheads="1" noChangeShapeType="1" noTextEdit="1"/>
+          </p:cNvSpPr>
+          <p:nvPr>
+            <p:extLst>
+              <p:ext uri="{386F3935-93C4-4BCD-93E2-E3B085C9AB24}">
+                <p16:designElem xmlns:p16="http://schemas.microsoft.com/office/powerpoint/2015/main" val="1"/>
+              </p:ext>
+            </p:extLst>
+          </p:nvPr>
+        </p:nvSpPr>
+        <p:spPr>
+          <a:xfrm>
+            <a:off x="3718560" y="5524786"/>
+            <a:ext cx="4754880" cy="27432"/>
+          </a:xfrm>
+          <a:prstGeom prst="rect">
+            <a:avLst/>
+          </a:prstGeom>
+          <a:solidFill>
+            <a:schemeClr val="accent2"/>
+          </a:solidFill>
+          <a:ln>
+            <a:noFill/>
+          </a:ln>
+        </p:spPr>
+        <p:style>
+          <a:lnRef idx="2">
+            <a:schemeClr val="accent1">
+              <a:shade val="50000"/>
+            </a:schemeClr>
+          </a:lnRef>
+          <a:fillRef idx="1">
+            <a:schemeClr val="accent1"/>
+          </a:fillRef>
+          <a:effectRef idx="0">
+            <a:schemeClr val="accent1"/>
+          </a:effectRef>
+          <a:fontRef idx="minor">
+            <a:schemeClr val="lt1"/>
+          </a:fontRef>
+        </p:style>
+        <p:txBody>
+          <a:bodyPr rtlCol="0" anchor="ctr"/>
+          <a:lstStyle/>
+          <a:p>
+            <a:pPr marL="0" marR="0" lvl="0" indent="0" algn="ctr" defTabSz="914400" rtl="0" eaLnBrk="1" fontAlgn="auto" latinLnBrk="0" hangingPunct="1">
+              <a:lnSpc>
+                <a:spcPct val="100000"/>
+              </a:lnSpc>
+              <a:spcBef>
+                <a:spcPts val="0"/>
+              </a:spcBef>
+              <a:spcAft>
+                <a:spcPts val="0"/>
+              </a:spcAft>
+              <a:buClrTx/>
+              <a:buSzTx/>
+              <a:buFontTx/>
+              <a:buNone/>
+              <a:tabLst/>
+              <a:defRPr/>
+            </a:pPr>
+            <a:endParaRPr kumimoji="0" lang="en-US" sz="1800" b="0" i="0" u="none" strike="noStrike" kern="1200" cap="none" spc="0" normalizeH="0" baseline="0" noProof="0">
+              <a:ln>
+                <a:noFill/>
+              </a:ln>
+              <a:solidFill>
+                <a:prstClr val="white"/>
+              </a:solidFill>
+              <a:effectLst/>
+              <a:uLnTx/>
+              <a:uFillTx/>
+              <a:latin typeface="Calibri" panose="020F0502020204030204"/>
+              <a:ea typeface="+mn-ea"/>
+              <a:cs typeface="+mn-cs"/>
+            </a:endParaRPr>
           </a:p>
         </p:txBody>
       </p:sp>
     </p:spTree>
     <p:extLst>
       <p:ext uri="{BB962C8B-B14F-4D97-AF65-F5344CB8AC3E}">
-        <p14:creationId xmlns:p14="http://schemas.microsoft.com/office/powerpoint/2010/main" val="1723401002"/>
+        <p14:creationId xmlns:p14="http://schemas.microsoft.com/office/powerpoint/2010/main" val="2877349472"/>
       </p:ext>
     </p:extLst>
   </p:cSld>
@@ -3688,7 +4692,7 @@
           <p:cNvPr id="2" name="Title 1">
             <a:extLst>
               <a:ext uri="{FF2B5EF4-FFF2-40B4-BE49-F238E27FC236}">
-                <a16:creationId xmlns:a16="http://schemas.microsoft.com/office/drawing/2014/main" id="{FE321C4B-1D8A-071F-8B57-E074A241D893}"/>
+                <a16:creationId xmlns:a16="http://schemas.microsoft.com/office/drawing/2014/main" id="{3131930F-4C4B-BE6D-B564-4556470DFA48}"/>
               </a:ext>
             </a:extLst>
           </p:cNvPr>
@@ -3706,7 +4710,7 @@
           <a:p>
             <a:r>
               <a:rPr lang="en-GB" dirty="0"/>
-              <a:t>Databases</a:t>
+              <a:t>Unity Gaming Services | Analytics</a:t>
             </a:r>
           </a:p>
         </p:txBody>
@@ -3716,7 +4720,7 @@
           <p:cNvPr id="3" name="Content Placeholder 2">
             <a:extLst>
               <a:ext uri="{FF2B5EF4-FFF2-40B4-BE49-F238E27FC236}">
-                <a16:creationId xmlns:a16="http://schemas.microsoft.com/office/drawing/2014/main" id="{B83A090B-D189-B934-01D3-68F7DBE676DC}"/>
+                <a16:creationId xmlns:a16="http://schemas.microsoft.com/office/drawing/2014/main" id="{EE47D1AC-8453-7196-349F-0D84FAFF05F3}"/>
               </a:ext>
             </a:extLst>
           </p:cNvPr>
@@ -3739,7 +4743,7 @@
     </p:spTree>
     <p:extLst>
       <p:ext uri="{BB962C8B-B14F-4D97-AF65-F5344CB8AC3E}">
-        <p14:creationId xmlns:p14="http://schemas.microsoft.com/office/powerpoint/2010/main" val="2636701466"/>
+        <p14:creationId xmlns:p14="http://schemas.microsoft.com/office/powerpoint/2010/main" val="2047714991"/>
       </p:ext>
     </p:extLst>
   </p:cSld>
@@ -3771,7 +4775,7 @@
           <p:cNvPr id="2" name="Title 1">
             <a:extLst>
               <a:ext uri="{FF2B5EF4-FFF2-40B4-BE49-F238E27FC236}">
-                <a16:creationId xmlns:a16="http://schemas.microsoft.com/office/drawing/2014/main" id="{305F5D8D-71A4-8CAC-19E5-0339437C87F5}"/>
+                <a16:creationId xmlns:a16="http://schemas.microsoft.com/office/drawing/2014/main" id="{FC9486F3-7E48-4303-20A5-D08ECA0740A5}"/>
               </a:ext>
             </a:extLst>
           </p:cNvPr>
@@ -3789,7 +4793,7 @@
           <a:p>
             <a:r>
               <a:rPr lang="en-GB" dirty="0"/>
-              <a:t>Phone sensors</a:t>
+              <a:t>Unity Gaming Services | Monetization</a:t>
             </a:r>
           </a:p>
         </p:txBody>
@@ -3799,7 +4803,7 @@
           <p:cNvPr id="3" name="Content Placeholder 2">
             <a:extLst>
               <a:ext uri="{FF2B5EF4-FFF2-40B4-BE49-F238E27FC236}">
-                <a16:creationId xmlns:a16="http://schemas.microsoft.com/office/drawing/2014/main" id="{45D0563C-36B8-FE91-C2B1-EA40A21A47C8}"/>
+                <a16:creationId xmlns:a16="http://schemas.microsoft.com/office/drawing/2014/main" id="{A4FE0663-6AA9-48ED-0D41-6430CF4BDA5B}"/>
               </a:ext>
             </a:extLst>
           </p:cNvPr>
@@ -3822,7 +4826,7 @@
     </p:spTree>
     <p:extLst>
       <p:ext uri="{BB962C8B-B14F-4D97-AF65-F5344CB8AC3E}">
-        <p14:creationId xmlns:p14="http://schemas.microsoft.com/office/powerpoint/2010/main" val="2491338591"/>
+        <p14:creationId xmlns:p14="http://schemas.microsoft.com/office/powerpoint/2010/main" val="1723401002"/>
       </p:ext>
     </p:extLst>
   </p:cSld>
@@ -3854,7 +4858,7 @@
           <p:cNvPr id="2" name="Title 1">
             <a:extLst>
               <a:ext uri="{FF2B5EF4-FFF2-40B4-BE49-F238E27FC236}">
-                <a16:creationId xmlns:a16="http://schemas.microsoft.com/office/drawing/2014/main" id="{03197F44-8728-45C9-95B4-A8D3EA366031}"/>
+                <a16:creationId xmlns:a16="http://schemas.microsoft.com/office/drawing/2014/main" id="{FE321C4B-1D8A-071F-8B57-E074A241D893}"/>
               </a:ext>
             </a:extLst>
           </p:cNvPr>
@@ -3872,7 +4876,7 @@
           <a:p>
             <a:r>
               <a:rPr lang="en-GB" dirty="0"/>
-              <a:t>Device Sensors</a:t>
+              <a:t>Databases</a:t>
             </a:r>
           </a:p>
         </p:txBody>
@@ -3882,7 +4886,7 @@
           <p:cNvPr id="3" name="Content Placeholder 2">
             <a:extLst>
               <a:ext uri="{FF2B5EF4-FFF2-40B4-BE49-F238E27FC236}">
-                <a16:creationId xmlns:a16="http://schemas.microsoft.com/office/drawing/2014/main" id="{8D2FE5F1-3BF7-E497-D3DB-62CDB4404C31}"/>
+                <a16:creationId xmlns:a16="http://schemas.microsoft.com/office/drawing/2014/main" id="{B83A090B-D189-B934-01D3-68F7DBE676DC}"/>
               </a:ext>
             </a:extLst>
           </p:cNvPr>
@@ -3897,18 +4901,6 @@
         <p:txBody>
           <a:bodyPr/>
           <a:lstStyle/>
-          <a:p>
-            <a:r>
-              <a:rPr lang="en-GB" dirty="0"/>
-              <a:t>Touch Screen</a:t>
-            </a:r>
-          </a:p>
-          <a:p>
-            <a:r>
-              <a:rPr lang="en-GB"/>
-              <a:t>Camera XR</a:t>
-            </a:r>
-          </a:p>
           <a:p>
             <a:endParaRPr lang="en-GB"/>
           </a:p>
@@ -3917,7 +4909,7 @@
     </p:spTree>
     <p:extLst>
       <p:ext uri="{BB962C8B-B14F-4D97-AF65-F5344CB8AC3E}">
-        <p14:creationId xmlns:p14="http://schemas.microsoft.com/office/powerpoint/2010/main" val="827179749"/>
+        <p14:creationId xmlns:p14="http://schemas.microsoft.com/office/powerpoint/2010/main" val="2636701466"/>
       </p:ext>
     </p:extLst>
   </p:cSld>
@@ -3949,7 +4941,7 @@
           <p:cNvPr id="2" name="Title 1">
             <a:extLst>
               <a:ext uri="{FF2B5EF4-FFF2-40B4-BE49-F238E27FC236}">
-                <a16:creationId xmlns:a16="http://schemas.microsoft.com/office/drawing/2014/main" id="{517A185A-BADB-E76B-3D0B-30C6F43AB7D4}"/>
+                <a16:creationId xmlns:a16="http://schemas.microsoft.com/office/drawing/2014/main" id="{305F5D8D-71A4-8CAC-19E5-0339437C87F5}"/>
               </a:ext>
             </a:extLst>
           </p:cNvPr>
@@ -3965,7 +4957,10 @@
           <a:bodyPr/>
           <a:lstStyle/>
           <a:p>
-            <a:endParaRPr lang="en-GB"/>
+            <a:r>
+              <a:rPr lang="en-GB" dirty="0"/>
+              <a:t>Phone sensors</a:t>
+            </a:r>
           </a:p>
         </p:txBody>
       </p:sp>
@@ -3974,7 +4969,7 @@
           <p:cNvPr id="3" name="Content Placeholder 2">
             <a:extLst>
               <a:ext uri="{FF2B5EF4-FFF2-40B4-BE49-F238E27FC236}">
-                <a16:creationId xmlns:a16="http://schemas.microsoft.com/office/drawing/2014/main" id="{5E25EAE8-82A6-01BE-EC08-DAAA25F58E47}"/>
+                <a16:creationId xmlns:a16="http://schemas.microsoft.com/office/drawing/2014/main" id="{45D0563C-36B8-FE91-C2B1-EA40A21A47C8}"/>
               </a:ext>
             </a:extLst>
           </p:cNvPr>
@@ -3997,7 +4992,102 @@
     </p:spTree>
     <p:extLst>
       <p:ext uri="{BB962C8B-B14F-4D97-AF65-F5344CB8AC3E}">
-        <p14:creationId xmlns:p14="http://schemas.microsoft.com/office/powerpoint/2010/main" val="386661145"/>
+        <p14:creationId xmlns:p14="http://schemas.microsoft.com/office/powerpoint/2010/main" val="2491338591"/>
+      </p:ext>
+    </p:extLst>
+  </p:cSld>
+  <p:clrMapOvr>
+    <a:masterClrMapping/>
+  </p:clrMapOvr>
+</p:sld>
+</file>
+
+<file path=ppt/slides/slide9.xml><?xml version="1.0" encoding="utf-8"?>
+<p:sld xmlns:a="http://schemas.openxmlformats.org/drawingml/2006/main" xmlns:r="http://schemas.openxmlformats.org/officeDocument/2006/relationships" xmlns:p="http://schemas.openxmlformats.org/presentationml/2006/main">
+  <p:cSld>
+    <p:spTree>
+      <p:nvGrpSpPr>
+        <p:cNvPr id="1" name=""/>
+        <p:cNvGrpSpPr/>
+        <p:nvPr/>
+      </p:nvGrpSpPr>
+      <p:grpSpPr>
+        <a:xfrm>
+          <a:off x="0" y="0"/>
+          <a:ext cx="0" cy="0"/>
+          <a:chOff x="0" y="0"/>
+          <a:chExt cx="0" cy="0"/>
+        </a:xfrm>
+      </p:grpSpPr>
+      <p:sp>
+        <p:nvSpPr>
+          <p:cNvPr id="2" name="Title 1">
+            <a:extLst>
+              <a:ext uri="{FF2B5EF4-FFF2-40B4-BE49-F238E27FC236}">
+                <a16:creationId xmlns:a16="http://schemas.microsoft.com/office/drawing/2014/main" id="{03197F44-8728-45C9-95B4-A8D3EA366031}"/>
+              </a:ext>
+            </a:extLst>
+          </p:cNvPr>
+          <p:cNvSpPr>
+            <a:spLocks noGrp="1"/>
+          </p:cNvSpPr>
+          <p:nvPr>
+            <p:ph type="title"/>
+          </p:nvPr>
+        </p:nvSpPr>
+        <p:spPr/>
+        <p:txBody>
+          <a:bodyPr/>
+          <a:lstStyle/>
+          <a:p>
+            <a:r>
+              <a:rPr lang="en-GB" dirty="0"/>
+              <a:t>Device Sensors</a:t>
+            </a:r>
+          </a:p>
+        </p:txBody>
+      </p:sp>
+      <p:sp>
+        <p:nvSpPr>
+          <p:cNvPr id="3" name="Content Placeholder 2">
+            <a:extLst>
+              <a:ext uri="{FF2B5EF4-FFF2-40B4-BE49-F238E27FC236}">
+                <a16:creationId xmlns:a16="http://schemas.microsoft.com/office/drawing/2014/main" id="{8D2FE5F1-3BF7-E497-D3DB-62CDB4404C31}"/>
+              </a:ext>
+            </a:extLst>
+          </p:cNvPr>
+          <p:cNvSpPr>
+            <a:spLocks noGrp="1"/>
+          </p:cNvSpPr>
+          <p:nvPr>
+            <p:ph idx="1"/>
+          </p:nvPr>
+        </p:nvSpPr>
+        <p:spPr/>
+        <p:txBody>
+          <a:bodyPr/>
+          <a:lstStyle/>
+          <a:p>
+            <a:r>
+              <a:rPr lang="en-GB" dirty="0"/>
+              <a:t>Touch Screen</a:t>
+            </a:r>
+          </a:p>
+          <a:p>
+            <a:r>
+              <a:rPr lang="en-GB"/>
+              <a:t>Camera XR</a:t>
+            </a:r>
+          </a:p>
+          <a:p>
+            <a:endParaRPr lang="en-GB"/>
+          </a:p>
+        </p:txBody>
+      </p:sp>
+    </p:spTree>
+    <p:extLst>
+      <p:ext uri="{BB962C8B-B14F-4D97-AF65-F5344CB8AC3E}">
+        <p14:creationId xmlns:p14="http://schemas.microsoft.com/office/powerpoint/2010/main" val="827179749"/>
       </p:ext>
     </p:extLst>
   </p:cSld>

</xml_diff>